<commit_message>
Update registerNode of comm dgm
Update registerNode of comm dgm
</commit_message>
<xml_diff>
--- a/doc/dynamic view 150616_communication_dgm.pptx
+++ b/doc/dynamic view 150616_communication_dgm.pptx
@@ -4884,6 +4884,214 @@
           </a:fontRef>
         </p:style>
       </p:cxnSp>
+      <p:grpSp>
+        <p:nvGrpSpPr>
+          <p:cNvPr id="56" name="그룹 55"/>
+          <p:cNvGrpSpPr/>
+          <p:nvPr/>
+        </p:nvGrpSpPr>
+        <p:grpSpPr>
+          <a:xfrm>
+            <a:off x="6308607" y="4407391"/>
+            <a:ext cx="1857744" cy="551165"/>
+            <a:chOff x="6074530" y="4462633"/>
+            <a:chExt cx="1155381" cy="549211"/>
+          </a:xfrm>
+        </p:grpSpPr>
+        <p:sp>
+          <p:nvSpPr>
+            <p:cNvPr id="57" name="한쪽 모서리가 잘린 사각형 56"/>
+            <p:cNvSpPr/>
+            <p:nvPr/>
+          </p:nvSpPr>
+          <p:spPr>
+            <a:xfrm>
+              <a:off x="6074530" y="4474391"/>
+              <a:ext cx="1155381" cy="537453"/>
+            </a:xfrm>
+            <a:prstGeom prst="snip1Rect">
+              <a:avLst>
+                <a:gd name="adj" fmla="val 43048"/>
+              </a:avLst>
+            </a:prstGeom>
+            <a:solidFill>
+              <a:schemeClr val="tx1">
+                <a:lumMod val="75000"/>
+              </a:schemeClr>
+            </a:solidFill>
+            <a:ln w="9525">
+              <a:solidFill>
+                <a:schemeClr val="bg1">
+                  <a:lumMod val="75000"/>
+                  <a:lumOff val="25000"/>
+                </a:schemeClr>
+              </a:solidFill>
+            </a:ln>
+          </p:spPr>
+          <p:style>
+            <a:lnRef idx="2">
+              <a:schemeClr val="accent1">
+                <a:shade val="50000"/>
+              </a:schemeClr>
+            </a:lnRef>
+            <a:fillRef idx="1">
+              <a:schemeClr val="accent1"/>
+            </a:fillRef>
+            <a:effectRef idx="0">
+              <a:schemeClr val="accent1"/>
+            </a:effectRef>
+            <a:fontRef idx="minor">
+              <a:schemeClr val="lt1"/>
+            </a:fontRef>
+          </p:style>
+          <p:txBody>
+            <a:bodyPr rot="0" spcFirstLastPara="0" vertOverflow="overflow" horzOverflow="overflow" vert="horz" wrap="square" lIns="91440" tIns="45720" rIns="91440" bIns="45720" numCol="1" spcCol="0" rtlCol="0" fromWordArt="0" anchor="b" anchorCtr="0" forceAA="0" compatLnSpc="1">
+              <a:prstTxWarp prst="textNoShape">
+                <a:avLst/>
+              </a:prstTxWarp>
+              <a:noAutofit/>
+            </a:bodyPr>
+            <a:lstStyle/>
+            <a:p>
+              <a:r>
+                <a:rPr lang="en-US" altLang="ko-KR" sz="1000" b="1" dirty="0" smtClean="0">
+                  <a:solidFill>
+                    <a:schemeClr val="bg1">
+                      <a:lumMod val="75000"/>
+                      <a:lumOff val="25000"/>
+                    </a:schemeClr>
+                  </a:solidFill>
+                </a:rPr>
+                <a:t>Sa-Node </a:t>
+              </a:r>
+              <a:r>
+                <a:rPr lang="en-US" altLang="ko-KR" sz="1000" dirty="0" smtClean="0">
+                  <a:solidFill>
+                    <a:schemeClr val="bg1">
+                      <a:lumMod val="75000"/>
+                      <a:lumOff val="25000"/>
+                    </a:schemeClr>
+                  </a:solidFill>
+                </a:rPr>
+                <a:t>verify whether user’s serial is the same with SA-Node’s.</a:t>
+              </a:r>
+              <a:endParaRPr lang="ko-KR" altLang="en-US" sz="1000" dirty="0" smtClean="0">
+                <a:solidFill>
+                  <a:schemeClr val="bg1">
+                    <a:lumMod val="75000"/>
+                    <a:lumOff val="25000"/>
+                  </a:schemeClr>
+                </a:solidFill>
+              </a:endParaRPr>
+            </a:p>
+          </p:txBody>
+        </p:sp>
+        <p:sp>
+          <p:nvSpPr>
+            <p:cNvPr id="58" name="직각 삼각형 57"/>
+            <p:cNvSpPr/>
+            <p:nvPr/>
+          </p:nvSpPr>
+          <p:spPr>
+            <a:xfrm>
+              <a:off x="7084395" y="4462633"/>
+              <a:ext cx="143889" cy="231383"/>
+            </a:xfrm>
+            <a:prstGeom prst="rtTriangle">
+              <a:avLst/>
+            </a:prstGeom>
+            <a:solidFill>
+              <a:schemeClr val="bg1">
+                <a:lumMod val="50000"/>
+                <a:lumOff val="50000"/>
+              </a:schemeClr>
+            </a:solidFill>
+            <a:ln w="9525">
+              <a:solidFill>
+                <a:schemeClr val="tx1"/>
+              </a:solidFill>
+            </a:ln>
+          </p:spPr>
+          <p:style>
+            <a:lnRef idx="2">
+              <a:schemeClr val="accent1">
+                <a:shade val="50000"/>
+              </a:schemeClr>
+            </a:lnRef>
+            <a:fillRef idx="1">
+              <a:schemeClr val="accent1"/>
+            </a:fillRef>
+            <a:effectRef idx="0">
+              <a:schemeClr val="accent1"/>
+            </a:effectRef>
+            <a:fontRef idx="minor">
+              <a:schemeClr val="lt1"/>
+            </a:fontRef>
+          </p:style>
+          <p:txBody>
+            <a:bodyPr rot="0" spcFirstLastPara="0" vertOverflow="overflow" horzOverflow="overflow" vert="horz" wrap="square" lIns="91440" tIns="45720" rIns="91440" bIns="45720" numCol="1" spcCol="0" rtlCol="0" fromWordArt="0" anchor="ctr" anchorCtr="0" forceAA="0" compatLnSpc="1">
+              <a:prstTxWarp prst="textNoShape">
+                <a:avLst/>
+              </a:prstTxWarp>
+              <a:noAutofit/>
+            </a:bodyPr>
+            <a:lstStyle/>
+            <a:p>
+              <a:pPr algn="ctr"/>
+              <a:endParaRPr lang="ko-KR" altLang="en-US" sz="1200" dirty="0" smtClean="0">
+                <a:solidFill>
+                  <a:schemeClr val="bg1">
+                    <a:lumMod val="75000"/>
+                    <a:lumOff val="25000"/>
+                  </a:schemeClr>
+                </a:solidFill>
+              </a:endParaRPr>
+            </a:p>
+          </p:txBody>
+        </p:sp>
+      </p:grpSp>
+      <p:cxnSp>
+        <p:nvCxnSpPr>
+          <p:cNvPr id="6" name="직선 연결선 5"/>
+          <p:cNvCxnSpPr>
+            <a:endCxn id="84" idx="2"/>
+          </p:cNvCxnSpPr>
+          <p:nvPr/>
+        </p:nvCxnSpPr>
+        <p:spPr>
+          <a:xfrm flipH="1" flipV="1">
+            <a:off x="6696236" y="4160660"/>
+            <a:ext cx="464749" cy="246731"/>
+          </a:xfrm>
+          <a:prstGeom prst="line">
+            <a:avLst/>
+          </a:prstGeom>
+          <a:ln>
+            <a:solidFill>
+              <a:schemeClr val="bg1">
+                <a:lumMod val="75000"/>
+                <a:lumOff val="25000"/>
+              </a:schemeClr>
+            </a:solidFill>
+            <a:prstDash val="dash"/>
+            <a:tailEnd type="none" w="lg" len="lg"/>
+          </a:ln>
+        </p:spPr>
+        <p:style>
+          <a:lnRef idx="1">
+            <a:schemeClr val="accent1"/>
+          </a:lnRef>
+          <a:fillRef idx="0">
+            <a:schemeClr val="accent1"/>
+          </a:fillRef>
+          <a:effectRef idx="0">
+            <a:schemeClr val="accent1"/>
+          </a:effectRef>
+          <a:fontRef idx="minor">
+            <a:schemeClr val="tx1"/>
+          </a:fontRef>
+        </p:style>
+      </p:cxnSp>
     </p:spTree>
     <p:extLst>
       <p:ext uri="{BB962C8B-B14F-4D97-AF65-F5344CB8AC3E}">

</xml_diff>

<commit_message>
update notation of comm dgm
update notation of comm dgm
</commit_message>
<xml_diff>
--- a/doc/dynamic view 150616_communication_dgm.pptx
+++ b/doc/dynamic view 150616_communication_dgm.pptx
@@ -2106,7 +2106,7 @@
                 <a:lumOff val="25000"/>
               </a:schemeClr>
             </a:solidFill>
-            <a:tailEnd type="triangle"/>
+            <a:tailEnd type="arrow"/>
           </a:ln>
         </p:spPr>
         <p:style>
@@ -2526,7 +2526,7 @@
         </p:nvSpPr>
         <p:spPr>
           <a:xfrm>
-            <a:off x="6692484" y="5153227"/>
+            <a:off x="6764492" y="5272257"/>
             <a:ext cx="1800000" cy="965055"/>
           </a:xfrm>
           <a:prstGeom prst="rect">
@@ -2589,7 +2589,7 @@
         </p:nvCxnSpPr>
         <p:spPr>
           <a:xfrm>
-            <a:off x="6764492" y="5739242"/>
+            <a:off x="6836500" y="5858272"/>
             <a:ext cx="360040" cy="0"/>
           </a:xfrm>
           <a:prstGeom prst="straightConnector1">
@@ -2628,7 +2628,7 @@
         </p:nvCxnSpPr>
         <p:spPr>
           <a:xfrm>
-            <a:off x="6764492" y="5892758"/>
+            <a:off x="6836500" y="6011788"/>
             <a:ext cx="360040" cy="0"/>
           </a:xfrm>
           <a:prstGeom prst="straightConnector1">
@@ -2667,7 +2667,7 @@
         </p:nvCxnSpPr>
         <p:spPr>
           <a:xfrm>
-            <a:off x="6764492" y="6046274"/>
+            <a:off x="6836500" y="6165304"/>
             <a:ext cx="360040" cy="0"/>
           </a:xfrm>
           <a:prstGeom prst="straightConnector1">
@@ -2707,7 +2707,7 @@
         </p:nvSpPr>
         <p:spPr>
           <a:xfrm>
-            <a:off x="6751240" y="5399958"/>
+            <a:off x="6823248" y="5518988"/>
             <a:ext cx="360040" cy="90000"/>
           </a:xfrm>
           <a:prstGeom prst="rect">
@@ -2765,7 +2765,7 @@
         </p:nvSpPr>
         <p:spPr>
           <a:xfrm>
-            <a:off x="7092280" y="5175576"/>
+            <a:off x="7164288" y="5294606"/>
             <a:ext cx="1440160" cy="942706"/>
           </a:xfrm>
           <a:prstGeom prst="rect">
@@ -2888,7 +2888,7 @@
         </p:nvCxnSpPr>
         <p:spPr>
           <a:xfrm>
-            <a:off x="6764492" y="5589466"/>
+            <a:off x="6836500" y="5708496"/>
             <a:ext cx="346788" cy="0"/>
           </a:xfrm>
           <a:prstGeom prst="line">
@@ -3224,7 +3224,7 @@
                 <a:lumOff val="25000"/>
               </a:schemeClr>
             </a:solidFill>
-            <a:tailEnd type="triangle"/>
+            <a:tailEnd type="arrow"/>
           </a:ln>
         </p:spPr>
         <p:style>
@@ -3565,7 +3565,7 @@
                 <a:lumOff val="25000"/>
               </a:schemeClr>
             </a:solidFill>
-            <a:tailEnd type="triangle"/>
+            <a:tailEnd type="arrow"/>
           </a:ln>
         </p:spPr>
         <p:style>
@@ -3604,7 +3604,7 @@
                 <a:lumOff val="25000"/>
               </a:schemeClr>
             </a:solidFill>
-            <a:tailEnd type="triangle"/>
+            <a:tailEnd type="arrow"/>
           </a:ln>
         </p:spPr>
         <p:style>
@@ -4373,7 +4373,7 @@
         </p:nvGrpSpPr>
         <p:grpSpPr>
           <a:xfrm>
-            <a:off x="6751241" y="5183461"/>
+            <a:off x="6823249" y="5302491"/>
             <a:ext cx="409744" cy="139871"/>
             <a:chOff x="6751241" y="5064193"/>
             <a:chExt cx="409744" cy="139871"/>
@@ -4892,10 +4892,10 @@
         </p:nvGrpSpPr>
         <p:grpSpPr>
           <a:xfrm>
-            <a:off x="6308607" y="4407391"/>
-            <a:ext cx="1857744" cy="551165"/>
-            <a:chOff x="6074530" y="4462633"/>
-            <a:chExt cx="1155381" cy="549211"/>
+            <a:off x="6231396" y="4350031"/>
+            <a:ext cx="1895194" cy="738330"/>
+            <a:chOff x="5983459" y="4477352"/>
+            <a:chExt cx="1178672" cy="562201"/>
           </a:xfrm>
         </p:grpSpPr>
         <p:sp>
@@ -4906,7 +4906,7 @@
           </p:nvSpPr>
           <p:spPr>
             <a:xfrm>
-              <a:off x="6074530" y="4474391"/>
+              <a:off x="5983459" y="4502100"/>
               <a:ext cx="1155381" cy="537453"/>
             </a:xfrm>
             <a:prstGeom prst="snip1Rect">
@@ -4973,7 +4973,73 @@
                     </a:schemeClr>
                   </a:solidFill>
                 </a:rPr>
-                <a:t>verify whether user’s serial is the same with SA-Node’s.</a:t>
+                <a:t>verify </a:t>
+              </a:r>
+              <a:r>
+                <a:rPr lang="en-US" altLang="ko-KR" sz="1000" dirty="0" smtClean="0">
+                  <a:solidFill>
+                    <a:schemeClr val="bg1">
+                      <a:lumMod val="75000"/>
+                      <a:lumOff val="25000"/>
+                    </a:schemeClr>
+                  </a:solidFill>
+                </a:rPr>
+                <a:t>for security whether serial input</a:t>
+              </a:r>
+              <a:r>
+                <a:rPr lang="ko-KR" altLang="en-US" sz="1000">
+                  <a:solidFill>
+                    <a:schemeClr val="bg1">
+                      <a:lumMod val="75000"/>
+                      <a:lumOff val="25000"/>
+                    </a:schemeClr>
+                  </a:solidFill>
+                </a:rPr>
+                <a:t> </a:t>
+              </a:r>
+              <a:r>
+                <a:rPr lang="en-US" altLang="ko-KR" sz="1000" dirty="0" smtClean="0">
+                  <a:solidFill>
+                    <a:schemeClr val="bg1">
+                      <a:lumMod val="75000"/>
+                      <a:lumOff val="25000"/>
+                    </a:schemeClr>
+                  </a:solidFill>
+                </a:rPr>
+                <a:t>from user </a:t>
+              </a:r>
+              <a:r>
+                <a:rPr lang="en-US" altLang="ko-KR" sz="1000" dirty="0" smtClean="0">
+                  <a:solidFill>
+                    <a:schemeClr val="bg1">
+                      <a:lumMod val="75000"/>
+                      <a:lumOff val="25000"/>
+                    </a:schemeClr>
+                  </a:solidFill>
+                </a:rPr>
+                <a:t>is </a:t>
+              </a:r>
+              <a:r>
+                <a:rPr lang="en-US" altLang="ko-KR" sz="1000" dirty="0" smtClean="0">
+                  <a:solidFill>
+                    <a:schemeClr val="bg1">
+                      <a:lumMod val="75000"/>
+                      <a:lumOff val="25000"/>
+                    </a:schemeClr>
+                  </a:solidFill>
+                </a:rPr>
+                <a:t>the same with </a:t>
+              </a:r>
+              <a:r>
+                <a:rPr lang="en-US" altLang="ko-KR" sz="1000" dirty="0" smtClean="0">
+                  <a:solidFill>
+                    <a:schemeClr val="bg1">
+                      <a:lumMod val="75000"/>
+                      <a:lumOff val="25000"/>
+                    </a:schemeClr>
+                  </a:solidFill>
+                </a:rPr>
+                <a:t>SA-Node’s.</a:t>
               </a:r>
               <a:endParaRPr lang="ko-KR" altLang="en-US" sz="1000" dirty="0" smtClean="0">
                 <a:solidFill>
@@ -4994,8 +5060,8 @@
           </p:nvSpPr>
           <p:spPr>
             <a:xfrm>
-              <a:off x="7084395" y="4462633"/>
-              <a:ext cx="143889" cy="231383"/>
+              <a:off x="6943601" y="4477352"/>
+              <a:ext cx="218530" cy="257075"/>
             </a:xfrm>
             <a:prstGeom prst="rtTriangle">
               <a:avLst/>
@@ -5054,6 +5120,7 @@
         <p:nvCxnSpPr>
           <p:cNvPr id="6" name="직선 연결선 5"/>
           <p:cNvCxnSpPr>
+            <a:stCxn id="57" idx="3"/>
             <a:endCxn id="84" idx="2"/>
           </p:cNvCxnSpPr>
           <p:nvPr/>
@@ -5061,7 +5128,7 @@
         <p:spPr>
           <a:xfrm flipH="1" flipV="1">
             <a:off x="6696236" y="4160660"/>
-            <a:ext cx="464749" cy="246731"/>
+            <a:ext cx="464032" cy="221872"/>
           </a:xfrm>
           <a:prstGeom prst="line">
             <a:avLst/>

</xml_diff>

<commit_message>
update relation about self-check
update relation about self-check
</commit_message>
<xml_diff>
--- a/doc/dynamic view 150616_communication_dgm.pptx
+++ b/doc/dynamic view 150616_communication_dgm.pptx
@@ -132,7 +132,7 @@
       </p14:sectionLst>
     </p:ext>
     <p:ext uri="{EFAFB233-063F-42B5-8137-9DF3F51BA10A}">
-      <p15:sldGuideLst xmlns:p15="http://schemas.microsoft.com/office/powerpoint/2012/main" xmlns="">
+      <p15:sldGuideLst xmlns:p15="http://schemas.microsoft.com/office/powerpoint/2012/main">
         <p15:guide id="1" orient="horz" pos="527">
           <p15:clr>
             <a:srgbClr val="A4A3A4"/>
@@ -161,7 +161,7 @@
       </p15:sldGuideLst>
     </p:ext>
     <p:ext uri="{2D200454-40CA-4A62-9FC3-DE9A4176ACB9}">
-      <p15:notesGuideLst xmlns:p15="http://schemas.microsoft.com/office/powerpoint/2012/main" xmlns="">
+      <p15:notesGuideLst xmlns:p15="http://schemas.microsoft.com/office/powerpoint/2012/main">
         <p15:guide id="1" orient="horz" pos="2879">
           <p15:clr>
             <a:srgbClr val="A4A3A4"/>
@@ -276,7 +276,7 @@
               <a:pPr lvl="0">
                 <a:defRPr lang="ko-KR" altLang="en-US"/>
               </a:pPr>
-              <a:t>2015-06-17</a:t>
+              <a:t>2015-06-18</a:t>
             </a:fld>
             <a:endParaRPr lang="ko-KR" altLang="en-US"/>
           </a:p>
@@ -9412,11 +9412,7 @@
           <a:p>
             <a:r>
               <a:rPr lang="en-US" altLang="ko-KR" dirty="0" smtClean="0"/>
-              <a:t>5.3 Dynamic </a:t>
-            </a:r>
-            <a:r>
-              <a:rPr lang="en-US" altLang="ko-KR" dirty="0" smtClean="0"/>
-              <a:t>View(3)</a:t>
+              <a:t>5.3 Dynamic View(3)</a:t>
             </a:r>
             <a:endParaRPr lang="ko-KR" altLang="en-US" dirty="0"/>
           </a:p>
@@ -12626,11 +12622,7 @@
           <a:p>
             <a:r>
               <a:rPr lang="en-US" altLang="ko-KR" dirty="0" smtClean="0"/>
-              <a:t>5.3 Dynamic </a:t>
-            </a:r>
-            <a:r>
-              <a:rPr lang="en-US" altLang="ko-KR" dirty="0" smtClean="0"/>
-              <a:t>View(4)</a:t>
+              <a:t>5.3 Dynamic View(4)</a:t>
             </a:r>
             <a:endParaRPr lang="ko-KR" altLang="en-US" dirty="0"/>
           </a:p>
@@ -15259,7 +15251,7 @@
         </p:nvSpPr>
         <p:spPr>
           <a:xfrm>
-            <a:off x="2483768" y="2028596"/>
+            <a:off x="2483768" y="1844824"/>
             <a:ext cx="2290406" cy="472669"/>
           </a:xfrm>
           <a:prstGeom prst="rect">
@@ -15915,7 +15907,7 @@
         </p:nvSpPr>
         <p:spPr>
           <a:xfrm>
-            <a:off x="2031592" y="4556057"/>
+            <a:off x="2031592" y="4628065"/>
             <a:ext cx="2252376" cy="601135"/>
           </a:xfrm>
           <a:prstGeom prst="rect">
@@ -16000,6 +15992,198 @@
           </a:p>
         </p:txBody>
       </p:sp>
+      <p:sp>
+        <p:nvSpPr>
+          <p:cNvPr id="4" name="직사각형 3"/>
+          <p:cNvSpPr/>
+          <p:nvPr/>
+        </p:nvSpPr>
+        <p:spPr>
+          <a:xfrm>
+            <a:off x="3557912" y="2398400"/>
+            <a:ext cx="157866" cy="180632"/>
+          </a:xfrm>
+          <a:prstGeom prst="rect">
+            <a:avLst/>
+          </a:prstGeom>
+          <a:noFill/>
+          <a:ln w="9525">
+            <a:noFill/>
+          </a:ln>
+        </p:spPr>
+        <p:style>
+          <a:lnRef idx="2">
+            <a:schemeClr val="accent1">
+              <a:shade val="50000"/>
+            </a:schemeClr>
+          </a:lnRef>
+          <a:fillRef idx="1">
+            <a:schemeClr val="accent1"/>
+          </a:fillRef>
+          <a:effectRef idx="0">
+            <a:schemeClr val="accent1"/>
+          </a:effectRef>
+          <a:fontRef idx="minor">
+            <a:schemeClr val="lt1"/>
+          </a:fontRef>
+        </p:style>
+        <p:txBody>
+          <a:bodyPr rtlCol="0" anchor="ctr"/>
+          <a:lstStyle/>
+          <a:p>
+            <a:pPr algn="ctr"/>
+            <a:endParaRPr lang="ko-KR" altLang="en-US" sz="1200" dirty="0" smtClean="0">
+              <a:solidFill>
+                <a:schemeClr val="bg1">
+                  <a:lumMod val="75000"/>
+                  <a:lumOff val="25000"/>
+                </a:schemeClr>
+              </a:solidFill>
+            </a:endParaRPr>
+          </a:p>
+        </p:txBody>
+      </p:sp>
+      <p:cxnSp>
+        <p:nvCxnSpPr>
+          <p:cNvPr id="10" name="꺾인 연결선 9"/>
+          <p:cNvCxnSpPr>
+            <a:stCxn id="4" idx="1"/>
+            <a:endCxn id="4" idx="0"/>
+          </p:cNvCxnSpPr>
+          <p:nvPr/>
+        </p:nvCxnSpPr>
+        <p:spPr>
+          <a:xfrm rot="10800000" flipH="1">
+            <a:off x="3557911" y="2398400"/>
+            <a:ext cx="78933" cy="90316"/>
+          </a:xfrm>
+          <a:prstGeom prst="bentConnector4">
+            <a:avLst>
+              <a:gd name="adj1" fmla="val -124694"/>
+              <a:gd name="adj2" fmla="val 223040"/>
+            </a:avLst>
+          </a:prstGeom>
+          <a:ln>
+            <a:solidFill>
+              <a:schemeClr val="bg1">
+                <a:lumMod val="75000"/>
+                <a:lumOff val="25000"/>
+              </a:schemeClr>
+            </a:solidFill>
+            <a:tailEnd type="none" w="lg" len="lg"/>
+          </a:ln>
+        </p:spPr>
+        <p:style>
+          <a:lnRef idx="1">
+            <a:schemeClr val="accent1"/>
+          </a:lnRef>
+          <a:fillRef idx="0">
+            <a:schemeClr val="accent1"/>
+          </a:fillRef>
+          <a:effectRef idx="0">
+            <a:schemeClr val="accent1"/>
+          </a:effectRef>
+          <a:fontRef idx="minor">
+            <a:schemeClr val="tx1"/>
+          </a:fontRef>
+        </p:style>
+      </p:cxnSp>
+      <p:sp>
+        <p:nvSpPr>
+          <p:cNvPr id="13" name="직사각형 12"/>
+          <p:cNvSpPr/>
+          <p:nvPr/>
+        </p:nvSpPr>
+        <p:spPr>
+          <a:xfrm>
+            <a:off x="2277775" y="4506942"/>
+            <a:ext cx="146342" cy="146194"/>
+          </a:xfrm>
+          <a:prstGeom prst="rect">
+            <a:avLst/>
+          </a:prstGeom>
+          <a:noFill/>
+          <a:ln w="9525">
+            <a:noFill/>
+          </a:ln>
+        </p:spPr>
+        <p:style>
+          <a:lnRef idx="2">
+            <a:schemeClr val="accent1">
+              <a:shade val="50000"/>
+            </a:schemeClr>
+          </a:lnRef>
+          <a:fillRef idx="1">
+            <a:schemeClr val="accent1"/>
+          </a:fillRef>
+          <a:effectRef idx="0">
+            <a:schemeClr val="accent1"/>
+          </a:effectRef>
+          <a:fontRef idx="minor">
+            <a:schemeClr val="lt1"/>
+          </a:fontRef>
+        </p:style>
+        <p:txBody>
+          <a:bodyPr rtlCol="0" anchor="ctr"/>
+          <a:lstStyle/>
+          <a:p>
+            <a:pPr algn="ctr"/>
+            <a:endParaRPr lang="ko-KR" altLang="en-US" sz="1200" dirty="0" smtClean="0">
+              <a:solidFill>
+                <a:schemeClr val="bg1">
+                  <a:lumMod val="75000"/>
+                  <a:lumOff val="25000"/>
+                </a:schemeClr>
+              </a:solidFill>
+            </a:endParaRPr>
+          </a:p>
+        </p:txBody>
+      </p:sp>
+      <p:cxnSp>
+        <p:nvCxnSpPr>
+          <p:cNvPr id="16" name="꺾인 연결선 15"/>
+          <p:cNvCxnSpPr>
+            <a:stCxn id="13" idx="3"/>
+            <a:endCxn id="13" idx="2"/>
+          </p:cNvCxnSpPr>
+          <p:nvPr/>
+        </p:nvCxnSpPr>
+        <p:spPr>
+          <a:xfrm flipH="1">
+            <a:off x="2350946" y="4580039"/>
+            <a:ext cx="73171" cy="73097"/>
+          </a:xfrm>
+          <a:prstGeom prst="bentConnector4">
+            <a:avLst>
+              <a:gd name="adj1" fmla="val -143192"/>
+              <a:gd name="adj2" fmla="val 217276"/>
+            </a:avLst>
+          </a:prstGeom>
+          <a:ln>
+            <a:solidFill>
+              <a:schemeClr val="bg1">
+                <a:lumMod val="75000"/>
+                <a:lumOff val="25000"/>
+              </a:schemeClr>
+            </a:solidFill>
+            <a:tailEnd type="none" w="lg" len="lg"/>
+          </a:ln>
+        </p:spPr>
+        <p:style>
+          <a:lnRef idx="1">
+            <a:schemeClr val="accent1"/>
+          </a:lnRef>
+          <a:fillRef idx="0">
+            <a:schemeClr val="accent1"/>
+          </a:fillRef>
+          <a:effectRef idx="0">
+            <a:schemeClr val="accent1"/>
+          </a:effectRef>
+          <a:fontRef idx="minor">
+            <a:schemeClr val="tx1"/>
+          </a:fontRef>
+        </p:style>
+      </p:cxnSp>
     </p:spTree>
     <p:extLst>
       <p:ext uri="{BB962C8B-B14F-4D97-AF65-F5344CB8AC3E}">
@@ -16107,11 +16291,7 @@
           <a:p>
             <a:r>
               <a:rPr lang="en-US" altLang="ko-KR" dirty="0" smtClean="0"/>
-              <a:t>5.3 Dynamic </a:t>
-            </a:r>
-            <a:r>
-              <a:rPr lang="en-US" altLang="ko-KR" dirty="0" smtClean="0"/>
-              <a:t>View(5)</a:t>
+              <a:t>5.3 Dynamic View(5)</a:t>
             </a:r>
             <a:endParaRPr lang="ko-KR" altLang="en-US" dirty="0"/>
           </a:p>
@@ -16169,11 +16349,7 @@
           <a:p>
             <a:r>
               <a:rPr lang="en-US" altLang="ko-KR" dirty="0" smtClean="0"/>
-              <a:t>Communication Diagram: </a:t>
-            </a:r>
-            <a:r>
-              <a:rPr lang="en-US" altLang="ko-KR" dirty="0" smtClean="0"/>
-              <a:t>sensor mal-function</a:t>
+              <a:t>Communication Diagram: sensor mal-function</a:t>
             </a:r>
             <a:endParaRPr lang="ko-KR" altLang="en-US" dirty="0"/>
           </a:p>
@@ -18059,18 +18235,7 @@
                   </a:schemeClr>
                 </a:solidFill>
               </a:rPr>
-              <a:t>Check rule sets and decide </a:t>
-            </a:r>
-            <a:r>
-              <a:rPr lang="en-US" altLang="ko-KR" sz="1000" dirty="0" smtClean="0">
-                <a:solidFill>
-                  <a:schemeClr val="bg1">
-                    <a:lumMod val="75000"/>
-                    <a:lumOff val="25000"/>
-                  </a:schemeClr>
-                </a:solidFill>
-              </a:rPr>
-              <a:t>sensor mal-function</a:t>
+              <a:t>Check rule sets and decide sensor mal-function</a:t>
             </a:r>
           </a:p>
         </p:txBody>
@@ -18615,18 +18780,7 @@
                   </a:schemeClr>
                 </a:solidFill>
               </a:rPr>
-              <a:t>1.1aa: </a:t>
-            </a:r>
-            <a:r>
-              <a:rPr lang="en-US" altLang="ko-KR" sz="900" dirty="0" smtClean="0">
-                <a:solidFill>
-                  <a:schemeClr val="bg1">
-                    <a:lumMod val="75000"/>
-                    <a:lumOff val="25000"/>
-                  </a:schemeClr>
-                </a:solidFill>
-              </a:rPr>
-              <a:t>[</a:t>
+              <a:t>1.1aa: [</a:t>
             </a:r>
             <a:r>
               <a:rPr lang="en-US" altLang="ko-KR" sz="900" dirty="0" err="1" smtClean="0">
@@ -18637,18 +18791,7 @@
                   </a:schemeClr>
                 </a:solidFill>
               </a:rPr>
-              <a:t>r</a:t>
-            </a:r>
-            <a:r>
-              <a:rPr lang="en-US" altLang="ko-KR" sz="900" dirty="0" err="1" smtClean="0">
-                <a:solidFill>
-                  <a:schemeClr val="bg1">
-                    <a:lumMod val="75000"/>
-                    <a:lumOff val="25000"/>
-                  </a:schemeClr>
-                </a:solidFill>
-              </a:rPr>
-              <a:t>uleMatched</a:t>
+              <a:t>ruleMatched</a:t>
             </a:r>
             <a:r>
               <a:rPr lang="en-US" altLang="ko-KR" sz="900" dirty="0" smtClean="0">
@@ -18919,27 +19062,8 @@
                   </a:schemeClr>
                 </a:solidFill>
               </a:rPr>
-              <a:t>Send m</a:t>
-            </a:r>
-            <a:r>
-              <a:rPr lang="en-US" altLang="ko-KR" sz="1000" dirty="0" smtClean="0">
-                <a:solidFill>
-                  <a:schemeClr val="bg1">
-                    <a:lumMod val="75000"/>
-                    <a:lumOff val="25000"/>
-                  </a:schemeClr>
-                </a:solidFill>
-              </a:rPr>
-              <a:t>al-function message to predefined user. </a:t>
-            </a:r>
-            <a:endParaRPr lang="en-US" altLang="ko-KR" sz="1000" dirty="0" smtClean="0">
-              <a:solidFill>
-                <a:schemeClr val="bg1">
-                  <a:lumMod val="75000"/>
-                  <a:lumOff val="25000"/>
-                </a:schemeClr>
-              </a:solidFill>
-            </a:endParaRPr>
+              <a:t>Send mal-function message to predefined user. </a:t>
+            </a:r>
           </a:p>
         </p:txBody>
       </p:sp>
@@ -19612,14 +19736,6 @@
               </a:rPr>
               <a:t>* User may change both conditions and actions.</a:t>
             </a:r>
-            <a:endParaRPr lang="en-US" altLang="ko-KR" sz="1000" dirty="0" smtClean="0">
-              <a:solidFill>
-                <a:schemeClr val="bg1">
-                  <a:lumMod val="75000"/>
-                  <a:lumOff val="25000"/>
-                </a:schemeClr>
-              </a:solidFill>
-            </a:endParaRPr>
           </a:p>
         </p:txBody>
       </p:sp>
@@ -19793,11 +19909,7 @@
           <a:p>
             <a:r>
               <a:rPr lang="en-US" altLang="ko-KR" dirty="0" smtClean="0"/>
-              <a:t>5.3 Dynamic </a:t>
-            </a:r>
-            <a:r>
-              <a:rPr lang="en-US" altLang="ko-KR" dirty="0" smtClean="0"/>
-              <a:t>View(6)</a:t>
+              <a:t>5.3 Dynamic View(6)</a:t>
             </a:r>
             <a:endParaRPr lang="ko-KR" altLang="en-US" dirty="0"/>
           </a:p>
@@ -19827,15 +19939,7 @@
           <a:p>
             <a:r>
               <a:rPr lang="en-US" altLang="ko-KR" dirty="0" smtClean="0"/>
-              <a:t>Communication Diagram: </a:t>
-            </a:r>
-            <a:r>
-              <a:rPr lang="en-US" altLang="ko-KR" dirty="0" smtClean="0"/>
-              <a:t>actuator</a:t>
-            </a:r>
-            <a:r>
-              <a:rPr lang="en-US" altLang="ko-KR" dirty="0" smtClean="0"/>
-              <a:t> mal-function</a:t>
+              <a:t>Communication Diagram: actuator mal-function</a:t>
             </a:r>
             <a:endParaRPr lang="ko-KR" altLang="en-US" dirty="0"/>
           </a:p>
@@ -20913,18 +21017,7 @@
                   </a:schemeClr>
                 </a:solidFill>
               </a:rPr>
-              <a:t>2.2.b </a:t>
-            </a:r>
-            <a:r>
-              <a:rPr lang="en-US" altLang="ko-KR" sz="900" dirty="0" smtClean="0">
-                <a:solidFill>
-                  <a:schemeClr val="bg1">
-                    <a:lumMod val="75000"/>
-                    <a:lumOff val="25000"/>
-                  </a:schemeClr>
-                </a:solidFill>
-              </a:rPr>
-              <a:t>: </a:t>
+              <a:t>2.2.b : </a:t>
             </a:r>
             <a:r>
               <a:rPr lang="en-US" altLang="ko-KR" sz="900" dirty="0" err="1" smtClean="0">
@@ -22054,14 +22147,6 @@
                 </a:rPr>
                 <a:t>Check rule sets and </a:t>
               </a:r>
-              <a:endParaRPr lang="en-US" altLang="ko-KR" sz="1000" dirty="0" smtClean="0">
-                <a:solidFill>
-                  <a:schemeClr val="bg1">
-                    <a:lumMod val="75000"/>
-                    <a:lumOff val="25000"/>
-                  </a:schemeClr>
-                </a:solidFill>
-              </a:endParaRPr>
             </a:p>
             <a:p>
               <a:r>
@@ -22075,14 +22160,6 @@
                 </a:rPr>
                 <a:t>do predefined actions. (Close door) </a:t>
               </a:r>
-              <a:endParaRPr lang="en-US" altLang="ko-KR" sz="1000" dirty="0" smtClean="0">
-                <a:solidFill>
-                  <a:schemeClr val="bg1">
-                    <a:lumMod val="75000"/>
-                    <a:lumOff val="25000"/>
-                  </a:schemeClr>
-                </a:solidFill>
-              </a:endParaRPr>
             </a:p>
           </p:txBody>
         </p:sp>
@@ -23016,18 +23093,7 @@
                   </a:schemeClr>
                 </a:solidFill>
               </a:rPr>
-              <a:t>2.1</a:t>
-            </a:r>
-            <a:r>
-              <a:rPr lang="en-US" altLang="ko-KR" sz="900" dirty="0" smtClean="0">
-                <a:solidFill>
-                  <a:schemeClr val="bg1">
-                    <a:lumMod val="75000"/>
-                    <a:lumOff val="25000"/>
-                  </a:schemeClr>
-                </a:solidFill>
-              </a:rPr>
-              <a:t>: </a:t>
+              <a:t>2.1: </a:t>
             </a:r>
             <a:r>
               <a:rPr lang="en-US" altLang="ko-KR" sz="900" dirty="0" err="1" smtClean="0">
@@ -23480,29 +23546,7 @@
                   </a:schemeClr>
                 </a:solidFill>
               </a:rPr>
-              <a:t>2.2.a </a:t>
-            </a:r>
-            <a:r>
-              <a:rPr lang="en-US" altLang="ko-KR" sz="900" dirty="0" smtClean="0">
-                <a:solidFill>
-                  <a:schemeClr val="bg1">
-                    <a:lumMod val="75000"/>
-                    <a:lumOff val="25000"/>
-                  </a:schemeClr>
-                </a:solidFill>
-              </a:rPr>
-              <a:t>: </a:t>
-            </a:r>
-            <a:r>
-              <a:rPr lang="en-US" altLang="ko-KR" sz="900" dirty="0" smtClean="0">
-                <a:solidFill>
-                  <a:schemeClr val="bg1">
-                    <a:lumMod val="75000"/>
-                    <a:lumOff val="25000"/>
-                  </a:schemeClr>
-                </a:solidFill>
-              </a:rPr>
-              <a:t>set Alarm mode </a:t>
+              <a:t>2.2.a : set Alarm mode </a:t>
             </a:r>
           </a:p>
         </p:txBody>
@@ -23602,11 +23646,7 @@
           <a:p>
             <a:r>
               <a:rPr lang="en-US" altLang="ko-KR" dirty="0" smtClean="0"/>
-              <a:t>5.3 Dynamic </a:t>
-            </a:r>
-            <a:r>
-              <a:rPr lang="en-US" altLang="ko-KR" dirty="0" smtClean="0"/>
-              <a:t>View(7)</a:t>
+              <a:t>5.3 Dynamic View(7)</a:t>
             </a:r>
             <a:endParaRPr lang="ko-KR" altLang="en-US" dirty="0"/>
           </a:p>
@@ -23762,11 +23802,7 @@
           <a:p>
             <a:r>
               <a:rPr lang="en-US" altLang="ko-KR" dirty="0" smtClean="0"/>
-              <a:t>5.3 Dynamic </a:t>
-            </a:r>
-            <a:r>
-              <a:rPr lang="en-US" altLang="ko-KR" dirty="0" smtClean="0"/>
-              <a:t>View(8)</a:t>
+              <a:t>5.3 Dynamic View(8)</a:t>
             </a:r>
             <a:endParaRPr lang="ko-KR" altLang="en-US" dirty="0"/>
           </a:p>

</xml_diff>